<commit_message>
Update Projects & About pages / Date : 20181219
</commit_message>
<xml_diff>
--- a/downloads/이태현 Portfolio.PPTX
+++ b/downloads/이태현 Portfolio.PPTX
@@ -229,7 +229,7 @@
           <a:p>
             <a:fld id="{CBB1829F-0074-4DDF-9F27-67050C399C7F}" type="datetimeFigureOut">
               <a:rPr lang="ko-KR" altLang="en-US" smtClean="0"/>
-              <a:t>2018-12-18</a:t>
+              <a:t>2018-12-19</a:t>
             </a:fld>
             <a:endParaRPr lang="ko-KR" altLang="en-US"/>
           </a:p>
@@ -1263,7 +1263,7 @@
           <a:p>
             <a:fld id="{FB30EDBD-1C2D-4C1E-B459-B60219FAB484}" type="datetimeFigureOut">
               <a:rPr lang="ko-KR" altLang="en-US" smtClean="0"/>
-              <a:t>2018-12-18</a:t>
+              <a:t>2018-12-19</a:t>
             </a:fld>
             <a:endParaRPr lang="ko-KR" altLang="en-US"/>
           </a:p>
@@ -1426,7 +1426,7 @@
           <a:p>
             <a:fld id="{FB30EDBD-1C2D-4C1E-B459-B60219FAB484}" type="datetimeFigureOut">
               <a:rPr lang="ko-KR" altLang="en-US" smtClean="0"/>
-              <a:t>2018-12-18</a:t>
+              <a:t>2018-12-19</a:t>
             </a:fld>
             <a:endParaRPr lang="ko-KR" altLang="en-US"/>
           </a:p>
@@ -1599,7 +1599,7 @@
           <a:p>
             <a:fld id="{FB30EDBD-1C2D-4C1E-B459-B60219FAB484}" type="datetimeFigureOut">
               <a:rPr lang="ko-KR" altLang="en-US" smtClean="0"/>
-              <a:t>2018-12-18</a:t>
+              <a:t>2018-12-19</a:t>
             </a:fld>
             <a:endParaRPr lang="ko-KR" altLang="en-US"/>
           </a:p>
@@ -1762,7 +1762,7 @@
           <a:p>
             <a:fld id="{FB30EDBD-1C2D-4C1E-B459-B60219FAB484}" type="datetimeFigureOut">
               <a:rPr lang="ko-KR" altLang="en-US" smtClean="0"/>
-              <a:t>2018-12-18</a:t>
+              <a:t>2018-12-19</a:t>
             </a:fld>
             <a:endParaRPr lang="ko-KR" altLang="en-US"/>
           </a:p>
@@ -2002,7 +2002,7 @@
           <a:p>
             <a:fld id="{FB30EDBD-1C2D-4C1E-B459-B60219FAB484}" type="datetimeFigureOut">
               <a:rPr lang="ko-KR" altLang="en-US" smtClean="0"/>
-              <a:t>2018-12-18</a:t>
+              <a:t>2018-12-19</a:t>
             </a:fld>
             <a:endParaRPr lang="ko-KR" altLang="en-US"/>
           </a:p>
@@ -2282,7 +2282,7 @@
           <a:p>
             <a:fld id="{FB30EDBD-1C2D-4C1E-B459-B60219FAB484}" type="datetimeFigureOut">
               <a:rPr lang="ko-KR" altLang="en-US" smtClean="0"/>
-              <a:t>2018-12-18</a:t>
+              <a:t>2018-12-19</a:t>
             </a:fld>
             <a:endParaRPr lang="ko-KR" altLang="en-US"/>
           </a:p>
@@ -2696,7 +2696,7 @@
           <a:p>
             <a:fld id="{FB30EDBD-1C2D-4C1E-B459-B60219FAB484}" type="datetimeFigureOut">
               <a:rPr lang="ko-KR" altLang="en-US" smtClean="0"/>
-              <a:t>2018-12-18</a:t>
+              <a:t>2018-12-19</a:t>
             </a:fld>
             <a:endParaRPr lang="ko-KR" altLang="en-US"/>
           </a:p>
@@ -2808,7 +2808,7 @@
           <a:p>
             <a:fld id="{FB30EDBD-1C2D-4C1E-B459-B60219FAB484}" type="datetimeFigureOut">
               <a:rPr lang="ko-KR" altLang="en-US" smtClean="0"/>
-              <a:t>2018-12-18</a:t>
+              <a:t>2018-12-19</a:t>
             </a:fld>
             <a:endParaRPr lang="ko-KR" altLang="en-US"/>
           </a:p>
@@ -2898,7 +2898,7 @@
           <a:p>
             <a:fld id="{FB30EDBD-1C2D-4C1E-B459-B60219FAB484}" type="datetimeFigureOut">
               <a:rPr lang="ko-KR" altLang="en-US" smtClean="0"/>
-              <a:t>2018-12-18</a:t>
+              <a:t>2018-12-19</a:t>
             </a:fld>
             <a:endParaRPr lang="ko-KR" altLang="en-US"/>
           </a:p>
@@ -3168,7 +3168,7 @@
           <a:p>
             <a:fld id="{FB30EDBD-1C2D-4C1E-B459-B60219FAB484}" type="datetimeFigureOut">
               <a:rPr lang="ko-KR" altLang="en-US" smtClean="0"/>
-              <a:t>2018-12-18</a:t>
+              <a:t>2018-12-19</a:t>
             </a:fld>
             <a:endParaRPr lang="ko-KR" altLang="en-US"/>
           </a:p>
@@ -3415,7 +3415,7 @@
           <a:p>
             <a:fld id="{FB30EDBD-1C2D-4C1E-B459-B60219FAB484}" type="datetimeFigureOut">
               <a:rPr lang="ko-KR" altLang="en-US" smtClean="0"/>
-              <a:t>2018-12-18</a:t>
+              <a:t>2018-12-19</a:t>
             </a:fld>
             <a:endParaRPr lang="ko-KR" altLang="en-US"/>
           </a:p>
@@ -3621,7 +3621,7 @@
           <a:p>
             <a:fld id="{FB30EDBD-1C2D-4C1E-B459-B60219FAB484}" type="datetimeFigureOut">
               <a:rPr lang="ko-KR" altLang="en-US" smtClean="0"/>
-              <a:t>2018-12-18</a:t>
+              <a:t>2018-12-19</a:t>
             </a:fld>
             <a:endParaRPr lang="ko-KR" altLang="en-US"/>
           </a:p>
@@ -9383,7 +9383,7 @@
                 <a:ea typeface="나눔스퀘어 Bold" panose="020B0600000101010101" pitchFamily="50" charset="-127"/>
                 <a:cs typeface="Microsoft Sans Serif" panose="020B0604020202020204" pitchFamily="34" charset="0"/>
               </a:rPr>
-              <a:t>Apache, Front-end : Bootstrap</a:t>
+              <a:t>Apache Tomcat, Front-end : Bootstrap</a:t>
             </a:r>
             <a:endParaRPr lang="ko-KR" altLang="en-US" sz="1400" dirty="0">
               <a:solidFill>

</xml_diff>